<commit_message>
made inserted in without set project pure
</commit_message>
<xml_diff>
--- a/FPROG-Project.pptx
+++ b/FPROG-Project.pptx
@@ -113,6 +113,11 @@
       </a:defRPr>
     </a:lvl9pPr>
   </p:defaultTextStyle>
+  <p:extLst>
+    <p:ext uri="{EFAFB233-063F-42B5-8137-9DF3F51BA10A}">
+      <p15:sldGuideLst xmlns:p15="http://schemas.microsoft.com/office/powerpoint/2012/main"/>
+    </p:ext>
+  </p:extLst>
 </p:presentation>
 </file>
 
@@ -715,7 +720,7 @@
           <a:noFill/>
           <a:extLst>
             <a:ext uri="{909E8E84-426E-40dd-AFC4-6F175D3DCCD1}">
-              <a14:hiddenFill xmlns:a14="http://schemas.microsoft.com/office/drawing/2010/main" xmlns="">
+              <a14:hiddenFill xmlns="" xmlns:a14="http://schemas.microsoft.com/office/drawing/2010/main">
                 <a:solidFill>
                   <a:srgbClr val="FFFFFF"/>
                 </a:solidFill>
@@ -774,7 +779,7 @@
             </a:ln>
             <a:extLst>
               <a:ext uri="{91240B29-F687-4f45-9708-019B960494DF}">
-                <a14:hiddenLine xmlns:a14="http://schemas.microsoft.com/office/drawing/2010/main" xmlns="" w="9525">
+                <a14:hiddenLine xmlns="" xmlns:a14="http://schemas.microsoft.com/office/drawing/2010/main" w="9525">
                   <a:solidFill>
                     <a:srgbClr val="000000"/>
                   </a:solidFill>
@@ -864,7 +869,7 @@
             </a:ln>
             <a:extLst>
               <a:ext uri="{91240B29-F687-4f45-9708-019B960494DF}">
-                <a14:hiddenLine xmlns:a14="http://schemas.microsoft.com/office/drawing/2010/main" xmlns="" w="9525">
+                <a14:hiddenLine xmlns="" xmlns:a14="http://schemas.microsoft.com/office/drawing/2010/main" w="9525">
                   <a:solidFill>
                     <a:srgbClr val="000000"/>
                   </a:solidFill>
@@ -954,7 +959,7 @@
             </a:ln>
             <a:extLst>
               <a:ext uri="{91240B29-F687-4f45-9708-019B960494DF}">
-                <a14:hiddenLine xmlns:a14="http://schemas.microsoft.com/office/drawing/2010/main" xmlns="" w="9525">
+                <a14:hiddenLine xmlns="" xmlns:a14="http://schemas.microsoft.com/office/drawing/2010/main" w="9525">
                   <a:solidFill>
                     <a:srgbClr val="000000"/>
                   </a:solidFill>
@@ -988,7 +993,7 @@
             </a:ln>
             <a:extLst>
               <a:ext uri="{91240B29-F687-4f45-9708-019B960494DF}">
-                <a14:hiddenLine xmlns:a14="http://schemas.microsoft.com/office/drawing/2010/main" xmlns="" w="9525">
+                <a14:hiddenLine xmlns="" xmlns:a14="http://schemas.microsoft.com/office/drawing/2010/main" w="9525">
                   <a:solidFill>
                     <a:srgbClr val="000000"/>
                   </a:solidFill>
@@ -1078,7 +1083,7 @@
             </a:ln>
             <a:extLst>
               <a:ext uri="{91240B29-F687-4f45-9708-019B960494DF}">
-                <a14:hiddenLine xmlns:a14="http://schemas.microsoft.com/office/drawing/2010/main" xmlns="" w="9525">
+                <a14:hiddenLine xmlns="" xmlns:a14="http://schemas.microsoft.com/office/drawing/2010/main" w="9525">
                   <a:solidFill>
                     <a:srgbClr val="000000"/>
                   </a:solidFill>
@@ -1140,7 +1145,7 @@
             </a:ln>
             <a:extLst>
               <a:ext uri="{91240B29-F687-4f45-9708-019B960494DF}">
-                <a14:hiddenLine xmlns:a14="http://schemas.microsoft.com/office/drawing/2010/main" xmlns="" w="9525">
+                <a14:hiddenLine xmlns="" xmlns:a14="http://schemas.microsoft.com/office/drawing/2010/main" w="9525">
                   <a:solidFill>
                     <a:srgbClr val="000000"/>
                   </a:solidFill>
@@ -1202,7 +1207,7 @@
             </a:ln>
             <a:extLst>
               <a:ext uri="{91240B29-F687-4f45-9708-019B960494DF}">
-                <a14:hiddenLine xmlns:a14="http://schemas.microsoft.com/office/drawing/2010/main" xmlns="" w="9525">
+                <a14:hiddenLine xmlns="" xmlns:a14="http://schemas.microsoft.com/office/drawing/2010/main" w="9525">
                   <a:solidFill>
                     <a:srgbClr val="000000"/>
                   </a:solidFill>
@@ -1292,7 +1297,7 @@
             </a:ln>
             <a:extLst>
               <a:ext uri="{91240B29-F687-4f45-9708-019B960494DF}">
-                <a14:hiddenLine xmlns:a14="http://schemas.microsoft.com/office/drawing/2010/main" xmlns="" w="9525">
+                <a14:hiddenLine xmlns="" xmlns:a14="http://schemas.microsoft.com/office/drawing/2010/main" w="9525">
                   <a:solidFill>
                     <a:srgbClr val="000000"/>
                   </a:solidFill>
@@ -1354,7 +1359,7 @@
             </a:ln>
             <a:extLst>
               <a:ext uri="{91240B29-F687-4f45-9708-019B960494DF}">
-                <a14:hiddenLine xmlns:a14="http://schemas.microsoft.com/office/drawing/2010/main" xmlns="" w="9525">
+                <a14:hiddenLine xmlns="" xmlns:a14="http://schemas.microsoft.com/office/drawing/2010/main" w="9525">
                   <a:solidFill>
                     <a:srgbClr val="000000"/>
                   </a:solidFill>
@@ -1416,7 +1421,7 @@
             </a:ln>
             <a:extLst>
               <a:ext uri="{91240B29-F687-4f45-9708-019B960494DF}">
-                <a14:hiddenLine xmlns:a14="http://schemas.microsoft.com/office/drawing/2010/main" xmlns="" w="9525">
+                <a14:hiddenLine xmlns="" xmlns:a14="http://schemas.microsoft.com/office/drawing/2010/main" w="9525">
                   <a:solidFill>
                     <a:srgbClr val="000000"/>
                   </a:solidFill>
@@ -1506,7 +1511,7 @@
             </a:ln>
             <a:extLst>
               <a:ext uri="{91240B29-F687-4f45-9708-019B960494DF}">
-                <a14:hiddenLine xmlns:a14="http://schemas.microsoft.com/office/drawing/2010/main" xmlns="" w="9525">
+                <a14:hiddenLine xmlns="" xmlns:a14="http://schemas.microsoft.com/office/drawing/2010/main" w="9525">
                   <a:solidFill>
                     <a:srgbClr val="000000"/>
                   </a:solidFill>
@@ -1596,7 +1601,7 @@
             </a:ln>
             <a:extLst>
               <a:ext uri="{91240B29-F687-4f45-9708-019B960494DF}">
-                <a14:hiddenLine xmlns:a14="http://schemas.microsoft.com/office/drawing/2010/main" xmlns="" w="9525">
+                <a14:hiddenLine xmlns="" xmlns:a14="http://schemas.microsoft.com/office/drawing/2010/main" w="9525">
                   <a:solidFill>
                     <a:srgbClr val="000000"/>
                   </a:solidFill>
@@ -1658,7 +1663,7 @@
             </a:ln>
             <a:extLst>
               <a:ext uri="{91240B29-F687-4f45-9708-019B960494DF}">
-                <a14:hiddenLine xmlns:a14="http://schemas.microsoft.com/office/drawing/2010/main" xmlns="" w="9525">
+                <a14:hiddenLine xmlns="" xmlns:a14="http://schemas.microsoft.com/office/drawing/2010/main" w="9525">
                   <a:solidFill>
                     <a:srgbClr val="000000"/>
                   </a:solidFill>
@@ -1768,7 +1773,7 @@
             </a:ln>
             <a:extLst>
               <a:ext uri="{91240B29-F687-4f45-9708-019B960494DF}">
-                <a14:hiddenLine xmlns:a14="http://schemas.microsoft.com/office/drawing/2010/main" xmlns="" w="9525">
+                <a14:hiddenLine xmlns="" xmlns:a14="http://schemas.microsoft.com/office/drawing/2010/main" w="9525">
                   <a:solidFill>
                     <a:srgbClr val="000000"/>
                   </a:solidFill>
@@ -1830,7 +1835,7 @@
             </a:ln>
             <a:extLst>
               <a:ext uri="{91240B29-F687-4f45-9708-019B960494DF}">
-                <a14:hiddenLine xmlns:a14="http://schemas.microsoft.com/office/drawing/2010/main" xmlns="" w="9525">
+                <a14:hiddenLine xmlns="" xmlns:a14="http://schemas.microsoft.com/office/drawing/2010/main" w="9525">
                   <a:solidFill>
                     <a:srgbClr val="000000"/>
                   </a:solidFill>
@@ -1920,7 +1925,7 @@
             </a:ln>
             <a:extLst>
               <a:ext uri="{91240B29-F687-4f45-9708-019B960494DF}">
-                <a14:hiddenLine xmlns:a14="http://schemas.microsoft.com/office/drawing/2010/main" xmlns="" w="9525">
+                <a14:hiddenLine xmlns="" xmlns:a14="http://schemas.microsoft.com/office/drawing/2010/main" w="9525">
                   <a:solidFill>
                     <a:srgbClr val="000000"/>
                   </a:solidFill>
@@ -2010,7 +2015,7 @@
             </a:ln>
             <a:extLst>
               <a:ext uri="{91240B29-F687-4f45-9708-019B960494DF}">
-                <a14:hiddenLine xmlns:a14="http://schemas.microsoft.com/office/drawing/2010/main" xmlns="" w="9525">
+                <a14:hiddenLine xmlns="" xmlns:a14="http://schemas.microsoft.com/office/drawing/2010/main" w="9525">
                   <a:solidFill>
                     <a:srgbClr val="000000"/>
                   </a:solidFill>
@@ -2072,7 +2077,7 @@
             </a:ln>
             <a:extLst>
               <a:ext uri="{91240B29-F687-4f45-9708-019B960494DF}">
-                <a14:hiddenLine xmlns:a14="http://schemas.microsoft.com/office/drawing/2010/main" xmlns="" w="9525">
+                <a14:hiddenLine xmlns="" xmlns:a14="http://schemas.microsoft.com/office/drawing/2010/main" w="9525">
                   <a:solidFill>
                     <a:srgbClr val="000000"/>
                   </a:solidFill>
@@ -2162,7 +2167,7 @@
             </a:ln>
             <a:extLst>
               <a:ext uri="{91240B29-F687-4f45-9708-019B960494DF}">
-                <a14:hiddenLine xmlns:a14="http://schemas.microsoft.com/office/drawing/2010/main" xmlns="" w="9525">
+                <a14:hiddenLine xmlns="" xmlns:a14="http://schemas.microsoft.com/office/drawing/2010/main" w="9525">
                   <a:solidFill>
                     <a:srgbClr val="000000"/>
                   </a:solidFill>
@@ -2252,7 +2257,7 @@
             </a:ln>
             <a:extLst>
               <a:ext uri="{91240B29-F687-4f45-9708-019B960494DF}">
-                <a14:hiddenLine xmlns:a14="http://schemas.microsoft.com/office/drawing/2010/main" xmlns="" w="9525">
+                <a14:hiddenLine xmlns="" xmlns:a14="http://schemas.microsoft.com/office/drawing/2010/main" w="9525">
                   <a:solidFill>
                     <a:srgbClr val="000000"/>
                   </a:solidFill>
@@ -2308,7 +2313,7 @@
             </a:ln>
             <a:extLst>
               <a:ext uri="{91240B29-F687-4f45-9708-019B960494DF}">
-                <a14:hiddenLine xmlns:a14="http://schemas.microsoft.com/office/drawing/2010/main" xmlns="" w="9525">
+                <a14:hiddenLine xmlns="" xmlns:a14="http://schemas.microsoft.com/office/drawing/2010/main" w="9525">
                   <a:solidFill>
                     <a:srgbClr val="000000"/>
                   </a:solidFill>
@@ -2398,7 +2403,7 @@
             </a:ln>
             <a:extLst>
               <a:ext uri="{91240B29-F687-4f45-9708-019B960494DF}">
-                <a14:hiddenLine xmlns:a14="http://schemas.microsoft.com/office/drawing/2010/main" xmlns="" w="9525">
+                <a14:hiddenLine xmlns="" xmlns:a14="http://schemas.microsoft.com/office/drawing/2010/main" w="9525">
                   <a:solidFill>
                     <a:srgbClr val="000000"/>
                   </a:solidFill>
@@ -2454,7 +2459,7 @@
             </a:ln>
             <a:extLst>
               <a:ext uri="{91240B29-F687-4f45-9708-019B960494DF}">
-                <a14:hiddenLine xmlns:a14="http://schemas.microsoft.com/office/drawing/2010/main" xmlns="" w="9525">
+                <a14:hiddenLine xmlns="" xmlns:a14="http://schemas.microsoft.com/office/drawing/2010/main" w="9525">
                   <a:solidFill>
                     <a:srgbClr val="000000"/>
                   </a:solidFill>
@@ -2544,7 +2549,7 @@
             </a:ln>
             <a:extLst>
               <a:ext uri="{91240B29-F687-4f45-9708-019B960494DF}">
-                <a14:hiddenLine xmlns:a14="http://schemas.microsoft.com/office/drawing/2010/main" xmlns="" w="9525">
+                <a14:hiddenLine xmlns="" xmlns:a14="http://schemas.microsoft.com/office/drawing/2010/main" w="9525">
                   <a:solidFill>
                     <a:srgbClr val="000000"/>
                   </a:solidFill>
@@ -2612,7 +2617,7 @@
             </a:ln>
             <a:extLst>
               <a:ext uri="{91240B29-F687-4f45-9708-019B960494DF}">
-                <a14:hiddenLine xmlns:a14="http://schemas.microsoft.com/office/drawing/2010/main" xmlns="" w="9525">
+                <a14:hiddenLine xmlns="" xmlns:a14="http://schemas.microsoft.com/office/drawing/2010/main" w="9525">
                   <a:solidFill>
                     <a:srgbClr val="000000"/>
                   </a:solidFill>
@@ -2702,7 +2707,7 @@
             </a:ln>
             <a:extLst>
               <a:ext uri="{91240B29-F687-4f45-9708-019B960494DF}">
-                <a14:hiddenLine xmlns:a14="http://schemas.microsoft.com/office/drawing/2010/main" xmlns="" w="9525">
+                <a14:hiddenLine xmlns="" xmlns:a14="http://schemas.microsoft.com/office/drawing/2010/main" w="9525">
                   <a:solidFill>
                     <a:srgbClr val="000000"/>
                   </a:solidFill>
@@ -2770,7 +2775,7 @@
             </a:ln>
             <a:extLst>
               <a:ext uri="{91240B29-F687-4f45-9708-019B960494DF}">
-                <a14:hiddenLine xmlns:a14="http://schemas.microsoft.com/office/drawing/2010/main" xmlns="" w="9525">
+                <a14:hiddenLine xmlns="" xmlns:a14="http://schemas.microsoft.com/office/drawing/2010/main" w="9525">
                   <a:solidFill>
                     <a:srgbClr val="000000"/>
                   </a:solidFill>
@@ -2860,7 +2865,7 @@
             </a:ln>
             <a:extLst>
               <a:ext uri="{91240B29-F687-4f45-9708-019B960494DF}">
-                <a14:hiddenLine xmlns:a14="http://schemas.microsoft.com/office/drawing/2010/main" xmlns="" w="9525">
+                <a14:hiddenLine xmlns="" xmlns:a14="http://schemas.microsoft.com/office/drawing/2010/main" w="9525">
                   <a:solidFill>
                     <a:srgbClr val="000000"/>
                   </a:solidFill>
@@ -2894,7 +2899,7 @@
             </a:ln>
             <a:extLst>
               <a:ext uri="{91240B29-F687-4f45-9708-019B960494DF}">
-                <a14:hiddenLine xmlns:a14="http://schemas.microsoft.com/office/drawing/2010/main" xmlns="" w="9525">
+                <a14:hiddenLine xmlns="" xmlns:a14="http://schemas.microsoft.com/office/drawing/2010/main" w="9525">
                   <a:solidFill>
                     <a:srgbClr val="000000"/>
                   </a:solidFill>
@@ -2984,7 +2989,7 @@
             </a:ln>
             <a:extLst>
               <a:ext uri="{91240B29-F687-4f45-9708-019B960494DF}">
-                <a14:hiddenLine xmlns:a14="http://schemas.microsoft.com/office/drawing/2010/main" xmlns="" w="9525">
+                <a14:hiddenLine xmlns="" xmlns:a14="http://schemas.microsoft.com/office/drawing/2010/main" w="9525">
                   <a:solidFill>
                     <a:srgbClr val="000000"/>
                   </a:solidFill>
@@ -3046,7 +3051,7 @@
             </a:ln>
             <a:extLst>
               <a:ext uri="{91240B29-F687-4f45-9708-019B960494DF}">
-                <a14:hiddenLine xmlns:a14="http://schemas.microsoft.com/office/drawing/2010/main" xmlns="" w="9525">
+                <a14:hiddenLine xmlns="" xmlns:a14="http://schemas.microsoft.com/office/drawing/2010/main" w="9525">
                   <a:solidFill>
                     <a:srgbClr val="000000"/>
                   </a:solidFill>
@@ -3108,7 +3113,7 @@
             </a:ln>
             <a:extLst>
               <a:ext uri="{91240B29-F687-4f45-9708-019B960494DF}">
-                <a14:hiddenLine xmlns:a14="http://schemas.microsoft.com/office/drawing/2010/main" xmlns="" w="9525">
+                <a14:hiddenLine xmlns="" xmlns:a14="http://schemas.microsoft.com/office/drawing/2010/main" w="9525">
                   <a:solidFill>
                     <a:srgbClr val="000000"/>
                   </a:solidFill>
@@ -3198,7 +3203,7 @@
             </a:ln>
             <a:extLst>
               <a:ext uri="{91240B29-F687-4f45-9708-019B960494DF}">
-                <a14:hiddenLine xmlns:a14="http://schemas.microsoft.com/office/drawing/2010/main" xmlns="" w="9525">
+                <a14:hiddenLine xmlns="" xmlns:a14="http://schemas.microsoft.com/office/drawing/2010/main" w="9525">
                   <a:solidFill>
                     <a:srgbClr val="000000"/>
                   </a:solidFill>
@@ -3266,7 +3271,7 @@
             </a:ln>
             <a:extLst>
               <a:ext uri="{91240B29-F687-4f45-9708-019B960494DF}">
-                <a14:hiddenLine xmlns:a14="http://schemas.microsoft.com/office/drawing/2010/main" xmlns="" w="9525">
+                <a14:hiddenLine xmlns="" xmlns:a14="http://schemas.microsoft.com/office/drawing/2010/main" w="9525">
                   <a:solidFill>
                     <a:srgbClr val="000000"/>
                   </a:solidFill>
@@ -3328,7 +3333,7 @@
             </a:ln>
             <a:extLst>
               <a:ext uri="{91240B29-F687-4f45-9708-019B960494DF}">
-                <a14:hiddenLine xmlns:a14="http://schemas.microsoft.com/office/drawing/2010/main" xmlns="" w="9525">
+                <a14:hiddenLine xmlns="" xmlns:a14="http://schemas.microsoft.com/office/drawing/2010/main" w="9525">
                   <a:solidFill>
                     <a:srgbClr val="000000"/>
                   </a:solidFill>
@@ -3418,7 +3423,7 @@
             </a:ln>
             <a:extLst>
               <a:ext uri="{91240B29-F687-4f45-9708-019B960494DF}">
-                <a14:hiddenLine xmlns:a14="http://schemas.microsoft.com/office/drawing/2010/main" xmlns="" w="9525">
+                <a14:hiddenLine xmlns="" xmlns:a14="http://schemas.microsoft.com/office/drawing/2010/main" w="9525">
                   <a:solidFill>
                     <a:srgbClr val="000000"/>
                   </a:solidFill>
@@ -3480,7 +3485,7 @@
             </a:ln>
             <a:extLst>
               <a:ext uri="{91240B29-F687-4f45-9708-019B960494DF}">
-                <a14:hiddenLine xmlns:a14="http://schemas.microsoft.com/office/drawing/2010/main" xmlns="" w="9525">
+                <a14:hiddenLine xmlns="" xmlns:a14="http://schemas.microsoft.com/office/drawing/2010/main" w="9525">
                   <a:solidFill>
                     <a:srgbClr val="000000"/>
                   </a:solidFill>
@@ -3570,7 +3575,7 @@
             </a:ln>
             <a:extLst>
               <a:ext uri="{91240B29-F687-4f45-9708-019B960494DF}">
-                <a14:hiddenLine xmlns:a14="http://schemas.microsoft.com/office/drawing/2010/main" xmlns="" w="9525">
+                <a14:hiddenLine xmlns="" xmlns:a14="http://schemas.microsoft.com/office/drawing/2010/main" w="9525">
                   <a:solidFill>
                     <a:srgbClr val="000000"/>
                   </a:solidFill>
@@ -3632,7 +3637,7 @@
             </a:ln>
             <a:extLst>
               <a:ext uri="{91240B29-F687-4f45-9708-019B960494DF}">
-                <a14:hiddenLine xmlns:a14="http://schemas.microsoft.com/office/drawing/2010/main" xmlns="" w="9525">
+                <a14:hiddenLine xmlns="" xmlns:a14="http://schemas.microsoft.com/office/drawing/2010/main" w="9525">
                   <a:solidFill>
                     <a:srgbClr val="000000"/>
                   </a:solidFill>
@@ -3722,7 +3727,7 @@
             </a:ln>
             <a:extLst>
               <a:ext uri="{91240B29-F687-4f45-9708-019B960494DF}">
-                <a14:hiddenLine xmlns:a14="http://schemas.microsoft.com/office/drawing/2010/main" xmlns="" w="9525">
+                <a14:hiddenLine xmlns="" xmlns:a14="http://schemas.microsoft.com/office/drawing/2010/main" w="9525">
                   <a:solidFill>
                     <a:srgbClr val="000000"/>
                   </a:solidFill>
@@ -3756,7 +3761,7 @@
             </a:ln>
             <a:extLst>
               <a:ext uri="{91240B29-F687-4f45-9708-019B960494DF}">
-                <a14:hiddenLine xmlns:a14="http://schemas.microsoft.com/office/drawing/2010/main" xmlns="" w="9525">
+                <a14:hiddenLine xmlns="" xmlns:a14="http://schemas.microsoft.com/office/drawing/2010/main" w="9525">
                   <a:solidFill>
                     <a:srgbClr val="000000"/>
                   </a:solidFill>
@@ -3821,7 +3826,7 @@
             </a:ln>
             <a:extLst>
               <a:ext uri="{91240B29-F687-4f45-9708-019B960494DF}">
-                <a14:hiddenLine xmlns:a14="http://schemas.microsoft.com/office/drawing/2010/main" xmlns="" w="9525">
+                <a14:hiddenLine xmlns="" xmlns:a14="http://schemas.microsoft.com/office/drawing/2010/main" w="9525">
                   <a:solidFill>
                     <a:srgbClr val="000000"/>
                   </a:solidFill>
@@ -3911,7 +3916,7 @@
             </a:ln>
             <a:extLst>
               <a:ext uri="{91240B29-F687-4f45-9708-019B960494DF}">
-                <a14:hiddenLine xmlns:a14="http://schemas.microsoft.com/office/drawing/2010/main" xmlns="" w="9525">
+                <a14:hiddenLine xmlns="" xmlns:a14="http://schemas.microsoft.com/office/drawing/2010/main" w="9525">
                   <a:solidFill>
                     <a:srgbClr val="000000"/>
                   </a:solidFill>
@@ -3973,7 +3978,7 @@
             </a:ln>
             <a:extLst>
               <a:ext uri="{91240B29-F687-4f45-9708-019B960494DF}">
-                <a14:hiddenLine xmlns:a14="http://schemas.microsoft.com/office/drawing/2010/main" xmlns="" w="9525">
+                <a14:hiddenLine xmlns="" xmlns:a14="http://schemas.microsoft.com/office/drawing/2010/main" w="9525">
                   <a:solidFill>
                     <a:srgbClr val="000000"/>
                   </a:solidFill>
@@ -4063,7 +4068,7 @@
             </a:ln>
             <a:extLst>
               <a:ext uri="{91240B29-F687-4f45-9708-019B960494DF}">
-                <a14:hiddenLine xmlns:a14="http://schemas.microsoft.com/office/drawing/2010/main" xmlns="" w="9525">
+                <a14:hiddenLine xmlns="" xmlns:a14="http://schemas.microsoft.com/office/drawing/2010/main" w="9525">
                   <a:solidFill>
                     <a:srgbClr val="000000"/>
                   </a:solidFill>
@@ -4153,7 +4158,7 @@
             </a:ln>
             <a:extLst>
               <a:ext uri="{91240B29-F687-4f45-9708-019B960494DF}">
-                <a14:hiddenLine xmlns:a14="http://schemas.microsoft.com/office/drawing/2010/main" xmlns="" w="9525">
+                <a14:hiddenLine xmlns="" xmlns:a14="http://schemas.microsoft.com/office/drawing/2010/main" w="9525">
                   <a:solidFill>
                     <a:srgbClr val="000000"/>
                   </a:solidFill>
@@ -4218,7 +4223,7 @@
             </a:ln>
             <a:extLst>
               <a:ext uri="{91240B29-F687-4f45-9708-019B960494DF}">
-                <a14:hiddenLine xmlns:a14="http://schemas.microsoft.com/office/drawing/2010/main" xmlns="" w="9525">
+                <a14:hiddenLine xmlns="" xmlns:a14="http://schemas.microsoft.com/office/drawing/2010/main" w="9525">
                   <a:solidFill>
                     <a:srgbClr val="000000"/>
                   </a:solidFill>
@@ -4280,7 +4285,7 @@
             </a:ln>
             <a:extLst>
               <a:ext uri="{91240B29-F687-4f45-9708-019B960494DF}">
-                <a14:hiddenLine xmlns:a14="http://schemas.microsoft.com/office/drawing/2010/main" xmlns="" w="9525">
+                <a14:hiddenLine xmlns="" xmlns:a14="http://schemas.microsoft.com/office/drawing/2010/main" w="9525">
                   <a:solidFill>
                     <a:srgbClr val="000000"/>
                   </a:solidFill>
@@ -4370,7 +4375,7 @@
             </a:ln>
             <a:extLst>
               <a:ext uri="{91240B29-F687-4f45-9708-019B960494DF}">
-                <a14:hiddenLine xmlns:a14="http://schemas.microsoft.com/office/drawing/2010/main" xmlns="" w="9525">
+                <a14:hiddenLine xmlns="" xmlns:a14="http://schemas.microsoft.com/office/drawing/2010/main" w="9525">
                   <a:solidFill>
                     <a:srgbClr val="000000"/>
                   </a:solidFill>
@@ -4460,7 +4465,7 @@
             </a:ln>
             <a:extLst>
               <a:ext uri="{91240B29-F687-4f45-9708-019B960494DF}">
-                <a14:hiddenLine xmlns:a14="http://schemas.microsoft.com/office/drawing/2010/main" xmlns="" w="9525">
+                <a14:hiddenLine xmlns="" xmlns:a14="http://schemas.microsoft.com/office/drawing/2010/main" w="9525">
                   <a:solidFill>
                     <a:srgbClr val="000000"/>
                   </a:solidFill>
@@ -4522,7 +4527,7 @@
             </a:ln>
             <a:extLst>
               <a:ext uri="{91240B29-F687-4f45-9708-019B960494DF}">
-                <a14:hiddenLine xmlns:a14="http://schemas.microsoft.com/office/drawing/2010/main" xmlns="" w="9525">
+                <a14:hiddenLine xmlns="" xmlns:a14="http://schemas.microsoft.com/office/drawing/2010/main" w="9525">
                   <a:solidFill>
                     <a:srgbClr val="000000"/>
                   </a:solidFill>
@@ -4642,7 +4647,7 @@
             </a:ln>
             <a:extLst>
               <a:ext uri="{91240B29-F687-4f45-9708-019B960494DF}">
-                <a14:hiddenLine xmlns:a14="http://schemas.microsoft.com/office/drawing/2010/main" xmlns="" w="9525">
+                <a14:hiddenLine xmlns="" xmlns:a14="http://schemas.microsoft.com/office/drawing/2010/main" w="9525">
                   <a:solidFill>
                     <a:srgbClr val="000000"/>
                   </a:solidFill>
@@ -4710,7 +4715,7 @@
             </a:ln>
             <a:extLst>
               <a:ext uri="{91240B29-F687-4f45-9708-019B960494DF}">
-                <a14:hiddenLine xmlns:a14="http://schemas.microsoft.com/office/drawing/2010/main" xmlns="" w="9525">
+                <a14:hiddenLine xmlns="" xmlns:a14="http://schemas.microsoft.com/office/drawing/2010/main" w="9525">
                   <a:solidFill>
                     <a:srgbClr val="000000"/>
                   </a:solidFill>
@@ -4800,7 +4805,7 @@
             </a:ln>
             <a:extLst>
               <a:ext uri="{91240B29-F687-4f45-9708-019B960494DF}">
-                <a14:hiddenLine xmlns:a14="http://schemas.microsoft.com/office/drawing/2010/main" xmlns="" w="9525">
+                <a14:hiddenLine xmlns="" xmlns:a14="http://schemas.microsoft.com/office/drawing/2010/main" w="9525">
                   <a:solidFill>
                     <a:srgbClr val="000000"/>
                   </a:solidFill>
@@ -9614,7 +9619,7 @@
           <a:noFill/>
           <a:extLst>
             <a:ext uri="{909E8E84-426E-40dd-AFC4-6F175D3DCCD1}">
-              <a14:hiddenFill xmlns:a14="http://schemas.microsoft.com/office/drawing/2010/main" xmlns="">
+              <a14:hiddenFill xmlns="" xmlns:a14="http://schemas.microsoft.com/office/drawing/2010/main">
                 <a:solidFill>
                   <a:srgbClr val="FFFFFF"/>
                 </a:solidFill>
@@ -9688,7 +9693,7 @@
               </a:ln>
               <a:extLst>
                 <a:ext uri="{91240B29-F687-4f45-9708-019B960494DF}">
-                  <a14:hiddenLine xmlns:a14="http://schemas.microsoft.com/office/drawing/2010/main" xmlns="" w="9525">
+                  <a14:hiddenLine xmlns="" xmlns:a14="http://schemas.microsoft.com/office/drawing/2010/main" w="9525">
                     <a:solidFill>
                       <a:srgbClr val="000000"/>
                     </a:solidFill>
@@ -9778,7 +9783,7 @@
               </a:ln>
               <a:extLst>
                 <a:ext uri="{91240B29-F687-4f45-9708-019B960494DF}">
-                  <a14:hiddenLine xmlns:a14="http://schemas.microsoft.com/office/drawing/2010/main" xmlns="" w="9525">
+                  <a14:hiddenLine xmlns="" xmlns:a14="http://schemas.microsoft.com/office/drawing/2010/main" w="9525">
                     <a:solidFill>
                       <a:srgbClr val="000000"/>
                     </a:solidFill>
@@ -9868,7 +9873,7 @@
               </a:ln>
               <a:extLst>
                 <a:ext uri="{91240B29-F687-4f45-9708-019B960494DF}">
-                  <a14:hiddenLine xmlns:a14="http://schemas.microsoft.com/office/drawing/2010/main" xmlns="" w="9525">
+                  <a14:hiddenLine xmlns="" xmlns:a14="http://schemas.microsoft.com/office/drawing/2010/main" w="9525">
                     <a:solidFill>
                       <a:srgbClr val="000000"/>
                     </a:solidFill>
@@ -9930,7 +9935,7 @@
               </a:ln>
               <a:extLst>
                 <a:ext uri="{91240B29-F687-4f45-9708-019B960494DF}">
-                  <a14:hiddenLine xmlns:a14="http://schemas.microsoft.com/office/drawing/2010/main" xmlns="" w="9525">
+                  <a14:hiddenLine xmlns="" xmlns:a14="http://schemas.microsoft.com/office/drawing/2010/main" w="9525">
                     <a:solidFill>
                       <a:srgbClr val="000000"/>
                     </a:solidFill>
@@ -10020,7 +10025,7 @@
               </a:ln>
               <a:extLst>
                 <a:ext uri="{91240B29-F687-4f45-9708-019B960494DF}">
-                  <a14:hiddenLine xmlns:a14="http://schemas.microsoft.com/office/drawing/2010/main" xmlns="" w="9525">
+                  <a14:hiddenLine xmlns="" xmlns:a14="http://schemas.microsoft.com/office/drawing/2010/main" w="9525">
                     <a:solidFill>
                       <a:srgbClr val="000000"/>
                     </a:solidFill>
@@ -10082,7 +10087,7 @@
               </a:ln>
               <a:extLst>
                 <a:ext uri="{91240B29-F687-4f45-9708-019B960494DF}">
-                  <a14:hiddenLine xmlns:a14="http://schemas.microsoft.com/office/drawing/2010/main" xmlns="" w="9525">
+                  <a14:hiddenLine xmlns="" xmlns:a14="http://schemas.microsoft.com/office/drawing/2010/main" w="9525">
                     <a:solidFill>
                       <a:srgbClr val="000000"/>
                     </a:solidFill>
@@ -10144,7 +10149,7 @@
               </a:ln>
               <a:extLst>
                 <a:ext uri="{91240B29-F687-4f45-9708-019B960494DF}">
-                  <a14:hiddenLine xmlns:a14="http://schemas.microsoft.com/office/drawing/2010/main" xmlns="" w="9525">
+                  <a14:hiddenLine xmlns="" xmlns:a14="http://schemas.microsoft.com/office/drawing/2010/main" w="9525">
                     <a:solidFill>
                       <a:srgbClr val="000000"/>
                     </a:solidFill>
@@ -10234,7 +10239,7 @@
               </a:ln>
               <a:extLst>
                 <a:ext uri="{91240B29-F687-4f45-9708-019B960494DF}">
-                  <a14:hiddenLine xmlns:a14="http://schemas.microsoft.com/office/drawing/2010/main" xmlns="" w="9525">
+                  <a14:hiddenLine xmlns="" xmlns:a14="http://schemas.microsoft.com/office/drawing/2010/main" w="9525">
                     <a:solidFill>
                       <a:srgbClr val="000000"/>
                     </a:solidFill>
@@ -10324,7 +10329,7 @@
               </a:ln>
               <a:extLst>
                 <a:ext uri="{91240B29-F687-4f45-9708-019B960494DF}">
-                  <a14:hiddenLine xmlns:a14="http://schemas.microsoft.com/office/drawing/2010/main" xmlns="" w="9525">
+                  <a14:hiddenLine xmlns="" xmlns:a14="http://schemas.microsoft.com/office/drawing/2010/main" w="9525">
                     <a:solidFill>
                       <a:srgbClr val="000000"/>
                     </a:solidFill>
@@ -10386,7 +10391,7 @@
               </a:ln>
               <a:extLst>
                 <a:ext uri="{91240B29-F687-4f45-9708-019B960494DF}">
-                  <a14:hiddenLine xmlns:a14="http://schemas.microsoft.com/office/drawing/2010/main" xmlns="" w="9525">
+                  <a14:hiddenLine xmlns="" xmlns:a14="http://schemas.microsoft.com/office/drawing/2010/main" w="9525">
                     <a:solidFill>
                       <a:srgbClr val="000000"/>
                     </a:solidFill>
@@ -10496,7 +10501,7 @@
               </a:ln>
               <a:extLst>
                 <a:ext uri="{91240B29-F687-4f45-9708-019B960494DF}">
-                  <a14:hiddenLine xmlns:a14="http://schemas.microsoft.com/office/drawing/2010/main" xmlns="" w="9525">
+                  <a14:hiddenLine xmlns="" xmlns:a14="http://schemas.microsoft.com/office/drawing/2010/main" w="9525">
                     <a:solidFill>
                       <a:srgbClr val="000000"/>
                     </a:solidFill>
@@ -10580,7 +10585,7 @@
               </a:ln>
               <a:extLst>
                 <a:ext uri="{91240B29-F687-4f45-9708-019B960494DF}">
-                  <a14:hiddenLine xmlns:a14="http://schemas.microsoft.com/office/drawing/2010/main" xmlns="" w="9525">
+                  <a14:hiddenLine xmlns="" xmlns:a14="http://schemas.microsoft.com/office/drawing/2010/main" w="9525">
                     <a:solidFill>
                       <a:srgbClr val="000000"/>
                     </a:solidFill>
@@ -10642,7 +10647,7 @@
               </a:ln>
               <a:extLst>
                 <a:ext uri="{91240B29-F687-4f45-9708-019B960494DF}">
-                  <a14:hiddenLine xmlns:a14="http://schemas.microsoft.com/office/drawing/2010/main" xmlns="" w="9525">
+                  <a14:hiddenLine xmlns="" xmlns:a14="http://schemas.microsoft.com/office/drawing/2010/main" w="9525">
                     <a:solidFill>
                       <a:srgbClr val="000000"/>
                     </a:solidFill>
@@ -10704,7 +10709,7 @@
               </a:ln>
               <a:extLst>
                 <a:ext uri="{91240B29-F687-4f45-9708-019B960494DF}">
-                  <a14:hiddenLine xmlns:a14="http://schemas.microsoft.com/office/drawing/2010/main" xmlns="" w="9525">
+                  <a14:hiddenLine xmlns="" xmlns:a14="http://schemas.microsoft.com/office/drawing/2010/main" w="9525">
                     <a:solidFill>
                       <a:srgbClr val="000000"/>
                     </a:solidFill>
@@ -10794,7 +10799,7 @@
               </a:ln>
               <a:extLst>
                 <a:ext uri="{91240B29-F687-4f45-9708-019B960494DF}">
-                  <a14:hiddenLine xmlns:a14="http://schemas.microsoft.com/office/drawing/2010/main" xmlns="" w="9525">
+                  <a14:hiddenLine xmlns="" xmlns:a14="http://schemas.microsoft.com/office/drawing/2010/main" w="9525">
                     <a:solidFill>
                       <a:srgbClr val="000000"/>
                     </a:solidFill>
@@ -10828,7 +10833,7 @@
               </a:ln>
               <a:extLst>
                 <a:ext uri="{91240B29-F687-4f45-9708-019B960494DF}">
-                  <a14:hiddenLine xmlns:a14="http://schemas.microsoft.com/office/drawing/2010/main" xmlns="" w="9525">
+                  <a14:hiddenLine xmlns="" xmlns:a14="http://schemas.microsoft.com/office/drawing/2010/main" w="9525">
                     <a:solidFill>
                       <a:srgbClr val="000000"/>
                     </a:solidFill>
@@ -10893,7 +10898,7 @@
               </a:ln>
               <a:extLst>
                 <a:ext uri="{91240B29-F687-4f45-9708-019B960494DF}">
-                  <a14:hiddenLine xmlns:a14="http://schemas.microsoft.com/office/drawing/2010/main" xmlns="" w="9525">
+                  <a14:hiddenLine xmlns="" xmlns:a14="http://schemas.microsoft.com/office/drawing/2010/main" w="9525">
                     <a:solidFill>
                       <a:srgbClr val="000000"/>
                     </a:solidFill>
@@ -10983,7 +10988,7 @@
               </a:ln>
               <a:extLst>
                 <a:ext uri="{91240B29-F687-4f45-9708-019B960494DF}">
-                  <a14:hiddenLine xmlns:a14="http://schemas.microsoft.com/office/drawing/2010/main" xmlns="" w="9525">
+                  <a14:hiddenLine xmlns="" xmlns:a14="http://schemas.microsoft.com/office/drawing/2010/main" w="9525">
                     <a:solidFill>
                       <a:srgbClr val="000000"/>
                     </a:solidFill>
@@ -11045,7 +11050,7 @@
               </a:ln>
               <a:extLst>
                 <a:ext uri="{91240B29-F687-4f45-9708-019B960494DF}">
-                  <a14:hiddenLine xmlns:a14="http://schemas.microsoft.com/office/drawing/2010/main" xmlns="" w="9525">
+                  <a14:hiddenLine xmlns="" xmlns:a14="http://schemas.microsoft.com/office/drawing/2010/main" w="9525">
                     <a:solidFill>
                       <a:srgbClr val="000000"/>
                     </a:solidFill>
@@ -11135,7 +11140,7 @@
               </a:ln>
               <a:extLst>
                 <a:ext uri="{91240B29-F687-4f45-9708-019B960494DF}">
-                  <a14:hiddenLine xmlns:a14="http://schemas.microsoft.com/office/drawing/2010/main" xmlns="" w="9525">
+                  <a14:hiddenLine xmlns="" xmlns:a14="http://schemas.microsoft.com/office/drawing/2010/main" w="9525">
                     <a:solidFill>
                       <a:srgbClr val="000000"/>
                     </a:solidFill>
@@ -11200,7 +11205,7 @@
               </a:ln>
               <a:extLst>
                 <a:ext uri="{91240B29-F687-4f45-9708-019B960494DF}">
-                  <a14:hiddenLine xmlns:a14="http://schemas.microsoft.com/office/drawing/2010/main" xmlns="" w="9525">
+                  <a14:hiddenLine xmlns="" xmlns:a14="http://schemas.microsoft.com/office/drawing/2010/main" w="9525">
                     <a:solidFill>
                       <a:srgbClr val="000000"/>
                     </a:solidFill>
@@ -11262,7 +11267,7 @@
               </a:ln>
               <a:extLst>
                 <a:ext uri="{91240B29-F687-4f45-9708-019B960494DF}">
-                  <a14:hiddenLine xmlns:a14="http://schemas.microsoft.com/office/drawing/2010/main" xmlns="" w="9525">
+                  <a14:hiddenLine xmlns="" xmlns:a14="http://schemas.microsoft.com/office/drawing/2010/main" w="9525">
                     <a:solidFill>
                       <a:srgbClr val="000000"/>
                     </a:solidFill>
@@ -11352,7 +11357,7 @@
               </a:ln>
               <a:extLst>
                 <a:ext uri="{91240B29-F687-4f45-9708-019B960494DF}">
-                  <a14:hiddenLine xmlns:a14="http://schemas.microsoft.com/office/drawing/2010/main" xmlns="" w="9525">
+                  <a14:hiddenLine xmlns="" xmlns:a14="http://schemas.microsoft.com/office/drawing/2010/main" w="9525">
                     <a:solidFill>
                       <a:srgbClr val="000000"/>
                     </a:solidFill>
@@ -11442,7 +11447,7 @@
               </a:ln>
               <a:extLst>
                 <a:ext uri="{91240B29-F687-4f45-9708-019B960494DF}">
-                  <a14:hiddenLine xmlns:a14="http://schemas.microsoft.com/office/drawing/2010/main" xmlns="" w="9525">
+                  <a14:hiddenLine xmlns="" xmlns:a14="http://schemas.microsoft.com/office/drawing/2010/main" w="9525">
                     <a:solidFill>
                       <a:srgbClr val="000000"/>
                     </a:solidFill>
@@ -11507,7 +11512,7 @@
               </a:ln>
               <a:extLst>
                 <a:ext uri="{91240B29-F687-4f45-9708-019B960494DF}">
-                  <a14:hiddenLine xmlns:a14="http://schemas.microsoft.com/office/drawing/2010/main" xmlns="" w="9525">
+                  <a14:hiddenLine xmlns="" xmlns:a14="http://schemas.microsoft.com/office/drawing/2010/main" w="9525">
                     <a:solidFill>
                       <a:srgbClr val="000000"/>
                     </a:solidFill>
@@ -11627,7 +11632,7 @@
               </a:ln>
               <a:extLst>
                 <a:ext uri="{91240B29-F687-4f45-9708-019B960494DF}">
-                  <a14:hiddenLine xmlns:a14="http://schemas.microsoft.com/office/drawing/2010/main" xmlns="" w="9525">
+                  <a14:hiddenLine xmlns="" xmlns:a14="http://schemas.microsoft.com/office/drawing/2010/main" w="9525">
                     <a:solidFill>
                       <a:srgbClr val="000000"/>
                     </a:solidFill>
@@ -11708,7 +11713,7 @@
               </a:ln>
               <a:extLst>
                 <a:ext uri="{91240B29-F687-4f45-9708-019B960494DF}">
-                  <a14:hiddenLine xmlns:a14="http://schemas.microsoft.com/office/drawing/2010/main" xmlns="" w="9525">
+                  <a14:hiddenLine xmlns="" xmlns:a14="http://schemas.microsoft.com/office/drawing/2010/main" w="9525">
                     <a:solidFill>
                       <a:srgbClr val="000000"/>
                     </a:solidFill>
@@ -11823,7 +11828,7 @@
               </a:ln>
               <a:extLst>
                 <a:ext uri="{91240B29-F687-4f45-9708-019B960494DF}">
-                  <a14:hiddenLine xmlns:a14="http://schemas.microsoft.com/office/drawing/2010/main" xmlns="" w="9525">
+                  <a14:hiddenLine xmlns="" xmlns:a14="http://schemas.microsoft.com/office/drawing/2010/main" w="9525">
                     <a:solidFill>
                       <a:srgbClr val="000000"/>
                     </a:solidFill>
@@ -11913,7 +11918,7 @@
               </a:ln>
               <a:extLst>
                 <a:ext uri="{91240B29-F687-4f45-9708-019B960494DF}">
-                  <a14:hiddenLine xmlns:a14="http://schemas.microsoft.com/office/drawing/2010/main" xmlns="" w="9525">
+                  <a14:hiddenLine xmlns="" xmlns:a14="http://schemas.microsoft.com/office/drawing/2010/main" w="9525">
                     <a:solidFill>
                       <a:srgbClr val="000000"/>
                     </a:solidFill>
@@ -11978,7 +11983,7 @@
               </a:ln>
               <a:extLst>
                 <a:ext uri="{91240B29-F687-4f45-9708-019B960494DF}">
-                  <a14:hiddenLine xmlns:a14="http://schemas.microsoft.com/office/drawing/2010/main" xmlns="" w="9525">
+                  <a14:hiddenLine xmlns="" xmlns:a14="http://schemas.microsoft.com/office/drawing/2010/main" w="9525">
                     <a:solidFill>
                       <a:srgbClr val="000000"/>
                     </a:solidFill>
@@ -12068,7 +12073,7 @@
               </a:ln>
               <a:extLst>
                 <a:ext uri="{91240B29-F687-4f45-9708-019B960494DF}">
-                  <a14:hiddenLine xmlns:a14="http://schemas.microsoft.com/office/drawing/2010/main" xmlns="" w="9525">
+                  <a14:hiddenLine xmlns="" xmlns:a14="http://schemas.microsoft.com/office/drawing/2010/main" w="9525">
                     <a:solidFill>
                       <a:srgbClr val="000000"/>
                     </a:solidFill>
@@ -12136,7 +12141,7 @@
               </a:ln>
               <a:extLst>
                 <a:ext uri="{91240B29-F687-4f45-9708-019B960494DF}">
-                  <a14:hiddenLine xmlns:a14="http://schemas.microsoft.com/office/drawing/2010/main" xmlns="" w="9525">
+                  <a14:hiddenLine xmlns="" xmlns:a14="http://schemas.microsoft.com/office/drawing/2010/main" w="9525">
                     <a:solidFill>
                       <a:srgbClr val="000000"/>
                     </a:solidFill>
@@ -12226,7 +12231,7 @@
               </a:ln>
               <a:extLst>
                 <a:ext uri="{91240B29-F687-4f45-9708-019B960494DF}">
-                  <a14:hiddenLine xmlns:a14="http://schemas.microsoft.com/office/drawing/2010/main" xmlns="" w="9525">
+                  <a14:hiddenLine xmlns="" xmlns:a14="http://schemas.microsoft.com/office/drawing/2010/main" w="9525">
                     <a:solidFill>
                       <a:srgbClr val="000000"/>
                     </a:solidFill>
@@ -12294,7 +12299,7 @@
               </a:ln>
               <a:extLst>
                 <a:ext uri="{91240B29-F687-4f45-9708-019B960494DF}">
-                  <a14:hiddenLine xmlns:a14="http://schemas.microsoft.com/office/drawing/2010/main" xmlns="" w="9525">
+                  <a14:hiddenLine xmlns="" xmlns:a14="http://schemas.microsoft.com/office/drawing/2010/main" w="9525">
                     <a:solidFill>
                       <a:srgbClr val="000000"/>
                     </a:solidFill>
@@ -12384,7 +12389,7 @@
               </a:ln>
               <a:extLst>
                 <a:ext uri="{91240B29-F687-4f45-9708-019B960494DF}">
-                  <a14:hiddenLine xmlns:a14="http://schemas.microsoft.com/office/drawing/2010/main" xmlns="" w="9525">
+                  <a14:hiddenLine xmlns="" xmlns:a14="http://schemas.microsoft.com/office/drawing/2010/main" w="9525">
                     <a:solidFill>
                       <a:srgbClr val="000000"/>
                     </a:solidFill>
@@ -12418,7 +12423,7 @@
               </a:ln>
               <a:extLst>
                 <a:ext uri="{91240B29-F687-4f45-9708-019B960494DF}">
-                  <a14:hiddenLine xmlns:a14="http://schemas.microsoft.com/office/drawing/2010/main" xmlns="" w="9525">
+                  <a14:hiddenLine xmlns="" xmlns:a14="http://schemas.microsoft.com/office/drawing/2010/main" w="9525">
                     <a:solidFill>
                       <a:srgbClr val="000000"/>
                     </a:solidFill>
@@ -13396,7 +13401,7 @@
               <a:rPr lang="en-US" dirty="0" err="1">
                 <a:sym typeface="Wingdings" panose="05000000000000000000" pitchFamily="2" charset="2"/>
               </a:rPr>
-              <a:t>auch</a:t>
+              <a:t>wir</a:t>
             </a:r>
             <a:r>
               <a:rPr lang="en-US" dirty="0">
@@ -13408,6 +13413,18 @@
               <a:rPr lang="en-US" dirty="0" err="1">
                 <a:sym typeface="Wingdings" panose="05000000000000000000" pitchFamily="2" charset="2"/>
               </a:rPr>
+              <a:t>auch</a:t>
+            </a:r>
+            <a:r>
+              <a:rPr lang="en-US" dirty="0">
+                <a:sym typeface="Wingdings" panose="05000000000000000000" pitchFamily="2" charset="2"/>
+              </a:rPr>
+              <a:t> </a:t>
+            </a:r>
+            <a:r>
+              <a:rPr lang="en-US" dirty="0" err="1">
+                <a:sym typeface="Wingdings" panose="05000000000000000000" pitchFamily="2" charset="2"/>
+              </a:rPr>
               <a:t>geachtet</a:t>
             </a:r>
             <a:r>
@@ -13665,14 +13682,11 @@
               <a:t>ein</a:t>
             </a:r>
             <a:r>
-              <a:rPr lang="en-US">
+              <a:rPr lang="en-US" dirty="0">
                 <a:sym typeface="Wingdings" panose="05000000000000000000" pitchFamily="2" charset="2"/>
               </a:rPr>
               <a:t> Wort</a:t>
             </a:r>
-            <a:endParaRPr lang="en-US" dirty="0">
-              <a:sym typeface="Wingdings" panose="05000000000000000000" pitchFamily="2" charset="2"/>
-            </a:endParaRPr>
           </a:p>
           <a:p>
             <a:pPr lvl="1"/>
@@ -13974,7 +13988,13 @@
               <a:rPr lang="de-AT" dirty="0">
                 <a:sym typeface="Wingdings" panose="05000000000000000000" pitchFamily="2" charset="2"/>
               </a:rPr>
-              <a:t> Tahas  287 </a:t>
+              <a:t> Tahas </a:t>
+            </a:r>
+            <a:r>
+              <a:rPr lang="de-AT">
+                <a:sym typeface="Wingdings" panose="05000000000000000000" pitchFamily="2" charset="2"/>
+              </a:rPr>
+              <a:t> 275 </a:t>
             </a:r>
             <a:r>
               <a:rPr lang="de-AT" dirty="0" err="1">

</xml_diff>